<commit_message>
Ajuste ppt aulas Python Big Data ....
</commit_message>
<xml_diff>
--- a/01 Classes/Aula 01 - Python Big Data.pptx
+++ b/01 Classes/Aula 01 - Python Big Data.pptx
@@ -6666,7 +6666,7 @@
                 <a:latin typeface="Times New Roman" panose="02020603050405020304" pitchFamily="18" charset="0"/>
                 <a:cs typeface="Times New Roman" panose="02020603050405020304" pitchFamily="18" charset="0"/>
               </a:rPr>
-              <a:t>("covidbrasil.csv") </a:t>
+              <a:t>("covidBrasil.csv") </a:t>
             </a:r>
           </a:p>
           <a:p>
@@ -6720,7 +6720,7 @@
                 <a:latin typeface="Times New Roman" panose="02020603050405020304" pitchFamily="18" charset="0"/>
                 <a:cs typeface="Times New Roman" panose="02020603050405020304" pitchFamily="18" charset="0"/>
               </a:rPr>
-              <a:t>("covidbrasil.csv", </a:t>
+              <a:t>("covidBrasil.csv", </a:t>
             </a:r>
             <a:r>
               <a:rPr lang="pt-BR" sz="2000" b="1" dirty="0" err="1">
@@ -6951,7 +6951,7 @@
                 <a:latin typeface="Times New Roman" panose="02020603050405020304" pitchFamily="18" charset="0"/>
                 <a:cs typeface="Times New Roman" panose="02020603050405020304" pitchFamily="18" charset="0"/>
               </a:rPr>
-              <a:t>("covidbrasil.csv", </a:t>
+              <a:t>("covidBrasil.csv", </a:t>
             </a:r>
             <a:r>
               <a:rPr lang="pt-BR" sz="2000" b="1" dirty="0" err="1">
@@ -7502,7 +7502,7 @@
                 <a:latin typeface="Times New Roman" panose="02020603050405020304" pitchFamily="18" charset="0"/>
                 <a:cs typeface="Times New Roman" panose="02020603050405020304" pitchFamily="18" charset="0"/>
               </a:rPr>
-              <a:t>("covidbrasil.csv", </a:t>
+              <a:t>("covidBrasil.csv", </a:t>
             </a:r>
             <a:r>
               <a:rPr lang="pt-BR" sz="1600" b="1" dirty="0" err="1">
@@ -8347,10 +8347,125 @@
             <a:pPr marL="0" indent="0" algn="just">
               <a:buNone/>
             </a:pPr>
-            <a:endParaRPr lang="pt-BR" sz="2000" dirty="0">
+            <a:endParaRPr lang="pt-BR" sz="2000" b="1" dirty="0">
               <a:latin typeface="Times New Roman" panose="02020603050405020304" pitchFamily="18" charset="0"/>
               <a:cs typeface="Times New Roman" panose="02020603050405020304" pitchFamily="18" charset="0"/>
             </a:endParaRPr>
+          </a:p>
+          <a:p>
+            <a:pPr marL="0" indent="0" algn="just">
+              <a:buNone/>
+            </a:pPr>
+            <a:r>
+              <a:rPr lang="pt-BR" sz="2000" b="1" dirty="0">
+                <a:latin typeface="Times New Roman" panose="02020603050405020304" pitchFamily="18" charset="0"/>
+                <a:cs typeface="Times New Roman" panose="02020603050405020304" pitchFamily="18" charset="0"/>
+              </a:rPr>
+              <a:t>Nota</a:t>
+            </a:r>
+            <a:r>
+              <a:rPr lang="pt-BR" sz="2000" dirty="0">
+                <a:latin typeface="Times New Roman" panose="02020603050405020304" pitchFamily="18" charset="0"/>
+                <a:cs typeface="Times New Roman" panose="02020603050405020304" pitchFamily="18" charset="0"/>
+              </a:rPr>
+              <a:t>: Autorizar acessar o Google Drive</a:t>
+            </a:r>
+          </a:p>
+          <a:p>
+            <a:pPr marL="0" indent="0" algn="just">
+              <a:buNone/>
+            </a:pPr>
+            <a:r>
+              <a:rPr lang="en-US" sz="2000" dirty="0">
+                <a:latin typeface="Times New Roman" panose="02020603050405020304" pitchFamily="18" charset="0"/>
+                <a:cs typeface="Times New Roman" panose="02020603050405020304" pitchFamily="18" charset="0"/>
+              </a:rPr>
+              <a:t>	</a:t>
+            </a:r>
+            <a:r>
+              <a:rPr lang="en-US" sz="2000" b="1" dirty="0">
+                <a:latin typeface="Times New Roman" panose="02020603050405020304" pitchFamily="18" charset="0"/>
+                <a:cs typeface="Times New Roman" panose="02020603050405020304" pitchFamily="18" charset="0"/>
+              </a:rPr>
+              <a:t>from</a:t>
+            </a:r>
+            <a:r>
+              <a:rPr lang="en-US" sz="2000" dirty="0">
+                <a:latin typeface="Times New Roman" panose="02020603050405020304" pitchFamily="18" charset="0"/>
+                <a:cs typeface="Times New Roman" panose="02020603050405020304" pitchFamily="18" charset="0"/>
+              </a:rPr>
+              <a:t> </a:t>
+            </a:r>
+            <a:r>
+              <a:rPr lang="en-US" sz="2000" b="1" dirty="0" err="1">
+                <a:solidFill>
+                  <a:srgbClr val="FF0000"/>
+                </a:solidFill>
+                <a:latin typeface="Times New Roman" panose="02020603050405020304" pitchFamily="18" charset="0"/>
+                <a:cs typeface="Times New Roman" panose="02020603050405020304" pitchFamily="18" charset="0"/>
+              </a:rPr>
+              <a:t>google.colab</a:t>
+            </a:r>
+            <a:r>
+              <a:rPr lang="en-US" sz="2000" b="1" dirty="0">
+                <a:solidFill>
+                  <a:srgbClr val="FF0000"/>
+                </a:solidFill>
+                <a:latin typeface="Times New Roman" panose="02020603050405020304" pitchFamily="18" charset="0"/>
+                <a:cs typeface="Times New Roman" panose="02020603050405020304" pitchFamily="18" charset="0"/>
+              </a:rPr>
+              <a:t> </a:t>
+            </a:r>
+            <a:r>
+              <a:rPr lang="en-US" sz="2000" dirty="0">
+                <a:latin typeface="Times New Roman" panose="02020603050405020304" pitchFamily="18" charset="0"/>
+                <a:cs typeface="Times New Roman" panose="02020603050405020304" pitchFamily="18" charset="0"/>
+              </a:rPr>
+              <a:t>import </a:t>
+            </a:r>
+            <a:r>
+              <a:rPr lang="en-US" sz="2000" b="1" dirty="0">
+                <a:solidFill>
+                  <a:srgbClr val="0070C0"/>
+                </a:solidFill>
+                <a:latin typeface="Times New Roman" panose="02020603050405020304" pitchFamily="18" charset="0"/>
+                <a:cs typeface="Times New Roman" panose="02020603050405020304" pitchFamily="18" charset="0"/>
+              </a:rPr>
+              <a:t>drive</a:t>
+            </a:r>
+          </a:p>
+          <a:p>
+            <a:pPr marL="0" indent="0" algn="just">
+              <a:buNone/>
+            </a:pPr>
+            <a:r>
+              <a:rPr lang="en-US" sz="2000" dirty="0">
+                <a:latin typeface="Times New Roman" panose="02020603050405020304" pitchFamily="18" charset="0"/>
+                <a:cs typeface="Times New Roman" panose="02020603050405020304" pitchFamily="18" charset="0"/>
+              </a:rPr>
+              <a:t>	</a:t>
+            </a:r>
+            <a:r>
+              <a:rPr lang="en-US" sz="2000" dirty="0" err="1">
+                <a:latin typeface="Times New Roman" panose="02020603050405020304" pitchFamily="18" charset="0"/>
+                <a:cs typeface="Times New Roman" panose="02020603050405020304" pitchFamily="18" charset="0"/>
+              </a:rPr>
+              <a:t>drive.</a:t>
+            </a:r>
+            <a:r>
+              <a:rPr lang="en-US" sz="2000" b="1" dirty="0" err="1">
+                <a:latin typeface="Times New Roman" panose="02020603050405020304" pitchFamily="18" charset="0"/>
+                <a:cs typeface="Times New Roman" panose="02020603050405020304" pitchFamily="18" charset="0"/>
+              </a:rPr>
+              <a:t>mount</a:t>
+            </a:r>
+            <a:r>
+              <a:rPr lang="en-US" sz="2000" dirty="0">
+                <a:latin typeface="Times New Roman" panose="02020603050405020304" pitchFamily="18" charset="0"/>
+                <a:cs typeface="Times New Roman" panose="02020603050405020304" pitchFamily="18" charset="0"/>
+              </a:rPr>
+              <a:t>('/content/drive')</a:t>
+            </a:r>
           </a:p>
           <a:p>
             <a:pPr marL="0" indent="0" algn="just">

</xml_diff>

<commit_message>
aulas ppt Python big data
</commit_message>
<xml_diff>
--- a/01 Classes/Aula 01 - Python Big Data.pptx
+++ b/01 Classes/Aula 01 - Python Big Data.pptx
@@ -6874,7 +6874,7 @@
               <a:buNone/>
             </a:pPr>
             <a:r>
-              <a:rPr lang="pt-BR" sz="2000" b="1" dirty="0">
+              <a:rPr lang="pt-BR" sz="1800" b="1" dirty="0">
                 <a:latin typeface="Times New Roman" panose="02020603050405020304" pitchFamily="18" charset="0"/>
                 <a:cs typeface="Times New Roman" panose="02020603050405020304" pitchFamily="18" charset="0"/>
               </a:rPr>
@@ -6886,14 +6886,14 @@
               <a:buNone/>
             </a:pPr>
             <a:r>
-              <a:rPr lang="pt-BR" sz="2000" dirty="0" err="1">
+              <a:rPr lang="pt-BR" sz="1800" dirty="0" err="1">
                 <a:latin typeface="Times New Roman" panose="02020603050405020304" pitchFamily="18" charset="0"/>
                 <a:cs typeface="Times New Roman" panose="02020603050405020304" pitchFamily="18" charset="0"/>
               </a:rPr>
               <a:t>cont</a:t>
             </a:r>
             <a:r>
-              <a:rPr lang="pt-BR" sz="2000" dirty="0">
+              <a:rPr lang="pt-BR" sz="1800" dirty="0">
                 <a:latin typeface="Times New Roman" panose="02020603050405020304" pitchFamily="18" charset="0"/>
                 <a:cs typeface="Times New Roman" panose="02020603050405020304" pitchFamily="18" charset="0"/>
               </a:rPr>
@@ -6905,63 +6905,63 @@
               <a:buNone/>
             </a:pPr>
             <a:r>
-              <a:rPr lang="pt-BR" sz="2000" b="1" dirty="0">
+              <a:rPr lang="pt-BR" sz="1800" b="1" dirty="0">
                 <a:latin typeface="Times New Roman" panose="02020603050405020304" pitchFamily="18" charset="0"/>
                 <a:cs typeface="Times New Roman" panose="02020603050405020304" pitchFamily="18" charset="0"/>
               </a:rPr>
               <a:t>for</a:t>
             </a:r>
             <a:r>
-              <a:rPr lang="pt-BR" sz="2000" dirty="0">
+              <a:rPr lang="pt-BR" sz="1800" dirty="0">
                 <a:latin typeface="Times New Roman" panose="02020603050405020304" pitchFamily="18" charset="0"/>
                 <a:cs typeface="Times New Roman" panose="02020603050405020304" pitchFamily="18" charset="0"/>
               </a:rPr>
               <a:t> </a:t>
             </a:r>
             <a:r>
-              <a:rPr lang="pt-BR" sz="2000" dirty="0" err="1">
+              <a:rPr lang="pt-BR" sz="1800" dirty="0" err="1">
                 <a:latin typeface="Times New Roman" panose="02020603050405020304" pitchFamily="18" charset="0"/>
                 <a:cs typeface="Times New Roman" panose="02020603050405020304" pitchFamily="18" charset="0"/>
               </a:rPr>
               <a:t>chunk</a:t>
             </a:r>
             <a:r>
-              <a:rPr lang="pt-BR" sz="2000" dirty="0">
+              <a:rPr lang="pt-BR" sz="1800" dirty="0">
                 <a:latin typeface="Times New Roman" panose="02020603050405020304" pitchFamily="18" charset="0"/>
                 <a:cs typeface="Times New Roman" panose="02020603050405020304" pitchFamily="18" charset="0"/>
               </a:rPr>
               <a:t> in  </a:t>
             </a:r>
             <a:r>
-              <a:rPr lang="pt-BR" sz="2000" dirty="0" err="1">
+              <a:rPr lang="pt-BR" sz="1800" dirty="0" err="1">
                 <a:latin typeface="Times New Roman" panose="02020603050405020304" pitchFamily="18" charset="0"/>
                 <a:cs typeface="Times New Roman" panose="02020603050405020304" pitchFamily="18" charset="0"/>
               </a:rPr>
               <a:t>pd.</a:t>
             </a:r>
             <a:r>
-              <a:rPr lang="pt-BR" sz="2000" b="1" dirty="0" err="1">
+              <a:rPr lang="pt-BR" sz="1800" b="1" dirty="0" err="1">
                 <a:latin typeface="Times New Roman" panose="02020603050405020304" pitchFamily="18" charset="0"/>
                 <a:cs typeface="Times New Roman" panose="02020603050405020304" pitchFamily="18" charset="0"/>
               </a:rPr>
               <a:t>read_csv</a:t>
             </a:r>
             <a:r>
-              <a:rPr lang="pt-BR" sz="2000" dirty="0">
+              <a:rPr lang="pt-BR" sz="1800" dirty="0">
                 <a:latin typeface="Times New Roman" panose="02020603050405020304" pitchFamily="18" charset="0"/>
                 <a:cs typeface="Times New Roman" panose="02020603050405020304" pitchFamily="18" charset="0"/>
               </a:rPr>
               <a:t>("covidBrasil.csv", </a:t>
             </a:r>
             <a:r>
-              <a:rPr lang="pt-BR" sz="2000" b="1" dirty="0" err="1">
+              <a:rPr lang="pt-BR" sz="1800" b="1" dirty="0" err="1">
                 <a:latin typeface="Times New Roman" panose="02020603050405020304" pitchFamily="18" charset="0"/>
                 <a:cs typeface="Times New Roman" panose="02020603050405020304" pitchFamily="18" charset="0"/>
               </a:rPr>
               <a:t>chunksize</a:t>
             </a:r>
             <a:r>
-              <a:rPr lang="pt-BR" sz="2000" dirty="0">
+              <a:rPr lang="pt-BR" sz="1800" dirty="0">
                 <a:latin typeface="Times New Roman" panose="02020603050405020304" pitchFamily="18" charset="0"/>
                 <a:cs typeface="Times New Roman" panose="02020603050405020304" pitchFamily="18" charset="0"/>
               </a:rPr>
@@ -6973,14 +6973,14 @@
               <a:buNone/>
             </a:pPr>
             <a:r>
-              <a:rPr lang="pt-BR" sz="2000" dirty="0">
+              <a:rPr lang="pt-BR" sz="1800" dirty="0">
                 <a:latin typeface="Times New Roman" panose="02020603050405020304" pitchFamily="18" charset="0"/>
                 <a:cs typeface="Times New Roman" panose="02020603050405020304" pitchFamily="18" charset="0"/>
               </a:rPr>
               <a:t>     colunas= ["</a:t>
             </a:r>
             <a:r>
-              <a:rPr lang="pt-BR" sz="2000" b="1" dirty="0" err="1">
+              <a:rPr lang="pt-BR" sz="1800" b="1" dirty="0" err="1">
                 <a:solidFill>
                   <a:srgbClr val="FF0000"/>
                 </a:solidFill>
@@ -6990,14 +6990,14 @@
               <a:t>city</a:t>
             </a:r>
             <a:r>
-              <a:rPr lang="pt-BR" sz="2000" dirty="0">
+              <a:rPr lang="pt-BR" sz="1800" dirty="0">
                 <a:latin typeface="Times New Roman" panose="02020603050405020304" pitchFamily="18" charset="0"/>
                 <a:cs typeface="Times New Roman" panose="02020603050405020304" pitchFamily="18" charset="0"/>
               </a:rPr>
               <a:t>", "</a:t>
             </a:r>
             <a:r>
-              <a:rPr lang="pt-BR" sz="2000" b="1" dirty="0" err="1">
+              <a:rPr lang="pt-BR" sz="1800" b="1" dirty="0" err="1">
                 <a:solidFill>
                   <a:srgbClr val="FF0000"/>
                 </a:solidFill>
@@ -7007,14 +7007,14 @@
               <a:t>state</a:t>
             </a:r>
             <a:r>
-              <a:rPr lang="pt-BR" sz="2000" dirty="0">
-                <a:latin typeface="Times New Roman" panose="02020603050405020304" pitchFamily="18" charset="0"/>
-                <a:cs typeface="Times New Roman" panose="02020603050405020304" pitchFamily="18" charset="0"/>
-              </a:rPr>
-              <a:t>", ... "</a:t>
-            </a:r>
-            <a:r>
-              <a:rPr lang="pt-BR" sz="2000" b="1" dirty="0" err="1">
+              <a:rPr lang="pt-BR" sz="1800" dirty="0">
+                <a:latin typeface="Times New Roman" panose="02020603050405020304" pitchFamily="18" charset="0"/>
+                <a:cs typeface="Times New Roman" panose="02020603050405020304" pitchFamily="18" charset="0"/>
+              </a:rPr>
+              <a:t>", "</a:t>
+            </a:r>
+            <a:r>
+              <a:rPr lang="pt-BR" sz="1800" b="1" dirty="0" err="1">
                 <a:solidFill>
                   <a:srgbClr val="FF0000"/>
                 </a:solidFill>
@@ -7024,7 +7024,7 @@
               <a:t>new_confirmed</a:t>
             </a:r>
             <a:r>
-              <a:rPr lang="pt-BR" sz="2000" dirty="0">
+              <a:rPr lang="pt-BR" sz="1800" dirty="0">
                 <a:latin typeface="Times New Roman" panose="02020603050405020304" pitchFamily="18" charset="0"/>
                 <a:cs typeface="Times New Roman" panose="02020603050405020304" pitchFamily="18" charset="0"/>
               </a:rPr>
@@ -7036,35 +7036,35 @@
               <a:buNone/>
             </a:pPr>
             <a:r>
-              <a:rPr lang="pt-BR" sz="2000" dirty="0">
+              <a:rPr lang="pt-BR" sz="1800" dirty="0">
                 <a:latin typeface="Times New Roman" panose="02020603050405020304" pitchFamily="18" charset="0"/>
                 <a:cs typeface="Times New Roman" panose="02020603050405020304" pitchFamily="18" charset="0"/>
               </a:rPr>
               <a:t>     </a:t>
             </a:r>
             <a:r>
-              <a:rPr lang="pt-BR" sz="2000" dirty="0" err="1">
+              <a:rPr lang="pt-BR" sz="1800" dirty="0" err="1">
                 <a:latin typeface="Times New Roman" panose="02020603050405020304" pitchFamily="18" charset="0"/>
                 <a:cs typeface="Times New Roman" panose="02020603050405020304" pitchFamily="18" charset="0"/>
               </a:rPr>
               <a:t>filtro_chunk</a:t>
             </a:r>
             <a:r>
-              <a:rPr lang="pt-BR" sz="2000" dirty="0">
+              <a:rPr lang="pt-BR" sz="1800" dirty="0">
                 <a:latin typeface="Times New Roman" panose="02020603050405020304" pitchFamily="18" charset="0"/>
                 <a:cs typeface="Times New Roman" panose="02020603050405020304" pitchFamily="18" charset="0"/>
               </a:rPr>
               <a:t> = </a:t>
             </a:r>
             <a:r>
-              <a:rPr lang="pt-BR" sz="2000" dirty="0" err="1">
+              <a:rPr lang="pt-BR" sz="1800" dirty="0" err="1">
                 <a:latin typeface="Times New Roman" panose="02020603050405020304" pitchFamily="18" charset="0"/>
                 <a:cs typeface="Times New Roman" panose="02020603050405020304" pitchFamily="18" charset="0"/>
               </a:rPr>
               <a:t>chunk</a:t>
             </a:r>
             <a:r>
-              <a:rPr lang="pt-BR" sz="2000" dirty="0">
+              <a:rPr lang="pt-BR" sz="1800" dirty="0">
                 <a:latin typeface="Times New Roman" panose="02020603050405020304" pitchFamily="18" charset="0"/>
                 <a:cs typeface="Times New Roman" panose="02020603050405020304" pitchFamily="18" charset="0"/>
               </a:rPr>
@@ -7076,73 +7076,96 @@
               <a:buNone/>
             </a:pPr>
             <a:r>
-              <a:rPr lang="pt-BR" sz="2000" dirty="0">
+              <a:rPr lang="pt-BR" sz="1800" dirty="0">
+                <a:latin typeface="Times New Roman" panose="02020603050405020304" pitchFamily="18" charset="0"/>
+                <a:cs typeface="Times New Roman" panose="02020603050405020304" pitchFamily="18" charset="0"/>
+              </a:rPr>
+              <a:t>     </a:t>
+            </a:r>
+            <a:r>
+              <a:rPr lang="pt-BR" sz="1800" dirty="0" err="1">
+                <a:latin typeface="Times New Roman" panose="02020603050405020304" pitchFamily="18" charset="0"/>
+                <a:cs typeface="Times New Roman" panose="02020603050405020304" pitchFamily="18" charset="0"/>
+              </a:rPr>
+              <a:t>details</a:t>
+            </a:r>
+            <a:r>
+              <a:rPr lang="pt-BR" sz="1800" dirty="0">
+                <a:latin typeface="Times New Roman" panose="02020603050405020304" pitchFamily="18" charset="0"/>
+                <a:cs typeface="Times New Roman" panose="02020603050405020304" pitchFamily="18" charset="0"/>
+              </a:rPr>
+              <a:t>["</a:t>
+            </a:r>
+            <a:r>
+              <a:rPr lang="pt-BR" sz="1800" dirty="0" err="1">
+                <a:latin typeface="Times New Roman" panose="02020603050405020304" pitchFamily="18" charset="0"/>
+                <a:cs typeface="Times New Roman" panose="02020603050405020304" pitchFamily="18" charset="0"/>
+              </a:rPr>
+              <a:t>count</a:t>
+            </a:r>
+            <a:r>
+              <a:rPr lang="pt-BR" sz="1800" dirty="0">
+                <a:latin typeface="Times New Roman" panose="02020603050405020304" pitchFamily="18" charset="0"/>
+                <a:cs typeface="Times New Roman" panose="02020603050405020304" pitchFamily="18" charset="0"/>
+              </a:rPr>
+              <a:t>"] = 1</a:t>
+            </a:r>
+          </a:p>
+          <a:p>
+            <a:pPr marL="0" indent="0" algn="just">
+              <a:buNone/>
+            </a:pPr>
+            <a:r>
+              <a:rPr lang="pt-BR" sz="1800" dirty="0">
                 <a:latin typeface="Times New Roman" panose="02020603050405020304" pitchFamily="18" charset="0"/>
                 <a:cs typeface="Times New Roman" panose="02020603050405020304" pitchFamily="18" charset="0"/>
               </a:rPr>
               <a:t>     resumo = </a:t>
             </a:r>
             <a:r>
-              <a:rPr lang="pt-BR" sz="2000" dirty="0" err="1">
+              <a:rPr lang="pt-BR" sz="1800" dirty="0" err="1">
                 <a:latin typeface="Times New Roman" panose="02020603050405020304" pitchFamily="18" charset="0"/>
                 <a:cs typeface="Times New Roman" panose="02020603050405020304" pitchFamily="18" charset="0"/>
               </a:rPr>
               <a:t>filtro_chunk.</a:t>
             </a:r>
             <a:r>
-              <a:rPr lang="pt-BR" sz="2000" b="1" dirty="0" err="1">
+              <a:rPr lang="pt-BR" sz="1800" b="1" dirty="0" err="1">
                 <a:latin typeface="Times New Roman" panose="02020603050405020304" pitchFamily="18" charset="0"/>
                 <a:cs typeface="Times New Roman" panose="02020603050405020304" pitchFamily="18" charset="0"/>
               </a:rPr>
               <a:t>groupby</a:t>
             </a:r>
             <a:r>
-              <a:rPr lang="pt-BR" sz="2000" dirty="0">
-                <a:latin typeface="Times New Roman" panose="02020603050405020304" pitchFamily="18" charset="0"/>
-                <a:cs typeface="Times New Roman" panose="02020603050405020304" pitchFamily="18" charset="0"/>
-              </a:rPr>
-              <a:t>("</a:t>
-            </a:r>
-            <a:r>
-              <a:rPr lang="pt-BR" sz="2000" b="1" dirty="0" err="1">
-                <a:solidFill>
-                  <a:srgbClr val="FF0000"/>
-                </a:solidFill>
-                <a:latin typeface="Times New Roman" panose="02020603050405020304" pitchFamily="18" charset="0"/>
-                <a:cs typeface="Times New Roman" panose="02020603050405020304" pitchFamily="18" charset="0"/>
-              </a:rPr>
-              <a:t>city</a:t>
-            </a:r>
-            <a:r>
-              <a:rPr lang="pt-BR" sz="2000" dirty="0">
-                <a:latin typeface="Times New Roman" panose="02020603050405020304" pitchFamily="18" charset="0"/>
-                <a:cs typeface="Times New Roman" panose="02020603050405020304" pitchFamily="18" charset="0"/>
-              </a:rPr>
-              <a:t>", </a:t>
-            </a:r>
-            <a:r>
-              <a:rPr lang="pt-BR" sz="2000" b="1" dirty="0" err="1">
+              <a:rPr lang="pt-BR" sz="1800" dirty="0">
+                <a:latin typeface="Times New Roman" panose="02020603050405020304" pitchFamily="18" charset="0"/>
+                <a:cs typeface="Times New Roman" panose="02020603050405020304" pitchFamily="18" charset="0"/>
+              </a:rPr>
+              <a:t>(colunas, </a:t>
+            </a:r>
+            <a:r>
+              <a:rPr lang="pt-BR" sz="1800" b="1" dirty="0" err="1">
                 <a:latin typeface="Times New Roman" panose="02020603050405020304" pitchFamily="18" charset="0"/>
                 <a:cs typeface="Times New Roman" panose="02020603050405020304" pitchFamily="18" charset="0"/>
               </a:rPr>
               <a:t>as_index</a:t>
             </a:r>
             <a:r>
-              <a:rPr lang="pt-BR" sz="2000" dirty="0">
+              <a:rPr lang="pt-BR" sz="1800" dirty="0">
                 <a:latin typeface="Times New Roman" panose="02020603050405020304" pitchFamily="18" charset="0"/>
                 <a:cs typeface="Times New Roman" panose="02020603050405020304" pitchFamily="18" charset="0"/>
               </a:rPr>
               <a:t>=False).</a:t>
             </a:r>
             <a:r>
-              <a:rPr lang="pt-BR" sz="2000" b="1" dirty="0" err="1">
+              <a:rPr lang="pt-BR" sz="1800" b="1" dirty="0" err="1">
                 <a:latin typeface="Times New Roman" panose="02020603050405020304" pitchFamily="18" charset="0"/>
                 <a:cs typeface="Times New Roman" panose="02020603050405020304" pitchFamily="18" charset="0"/>
               </a:rPr>
               <a:t>count</a:t>
             </a:r>
             <a:r>
-              <a:rPr lang="pt-BR" sz="2000" dirty="0">
+              <a:rPr lang="pt-BR" sz="1800" dirty="0">
                 <a:latin typeface="Times New Roman" panose="02020603050405020304" pitchFamily="18" charset="0"/>
                 <a:cs typeface="Times New Roman" panose="02020603050405020304" pitchFamily="18" charset="0"/>
               </a:rPr>
@@ -7154,21 +7177,21 @@
               <a:buNone/>
             </a:pPr>
             <a:r>
-              <a:rPr lang="pt-BR" sz="2000" dirty="0">
+              <a:rPr lang="pt-BR" sz="1800" dirty="0">
                 <a:latin typeface="Times New Roman" panose="02020603050405020304" pitchFamily="18" charset="0"/>
                 <a:cs typeface="Times New Roman" panose="02020603050405020304" pitchFamily="18" charset="0"/>
               </a:rPr>
               <a:t>     </a:t>
             </a:r>
             <a:r>
-              <a:rPr lang="pt-BR" sz="2000" b="1" dirty="0">
+              <a:rPr lang="pt-BR" sz="1800" b="1" dirty="0">
                 <a:latin typeface="Times New Roman" panose="02020603050405020304" pitchFamily="18" charset="0"/>
                 <a:cs typeface="Times New Roman" panose="02020603050405020304" pitchFamily="18" charset="0"/>
               </a:rPr>
               <a:t>display</a:t>
             </a:r>
             <a:r>
-              <a:rPr lang="pt-BR" sz="2000" dirty="0">
+              <a:rPr lang="pt-BR" sz="1800" dirty="0">
                 <a:latin typeface="Times New Roman" panose="02020603050405020304" pitchFamily="18" charset="0"/>
                 <a:cs typeface="Times New Roman" panose="02020603050405020304" pitchFamily="18" charset="0"/>
               </a:rPr>
@@ -7180,35 +7203,35 @@
               <a:buNone/>
             </a:pPr>
             <a:r>
-              <a:rPr lang="pt-BR" sz="2000" dirty="0">
+              <a:rPr lang="pt-BR" sz="1800" dirty="0">
                 <a:latin typeface="Times New Roman" panose="02020603050405020304" pitchFamily="18" charset="0"/>
                 <a:cs typeface="Times New Roman" panose="02020603050405020304" pitchFamily="18" charset="0"/>
               </a:rPr>
               <a:t>     </a:t>
             </a:r>
             <a:r>
-              <a:rPr lang="pt-BR" sz="2000" dirty="0" err="1">
+              <a:rPr lang="pt-BR" sz="1800" dirty="0" err="1">
                 <a:latin typeface="Times New Roman" panose="02020603050405020304" pitchFamily="18" charset="0"/>
                 <a:cs typeface="Times New Roman" panose="02020603050405020304" pitchFamily="18" charset="0"/>
               </a:rPr>
               <a:t>cont</a:t>
             </a:r>
             <a:r>
-              <a:rPr lang="pt-BR" sz="2000" dirty="0">
+              <a:rPr lang="pt-BR" sz="1800" dirty="0">
                 <a:latin typeface="Times New Roman" panose="02020603050405020304" pitchFamily="18" charset="0"/>
                 <a:cs typeface="Times New Roman" panose="02020603050405020304" pitchFamily="18" charset="0"/>
               </a:rPr>
               <a:t> = </a:t>
             </a:r>
             <a:r>
-              <a:rPr lang="pt-BR" sz="2000" dirty="0" err="1">
+              <a:rPr lang="pt-BR" sz="1800" dirty="0" err="1">
                 <a:latin typeface="Times New Roman" panose="02020603050405020304" pitchFamily="18" charset="0"/>
                 <a:cs typeface="Times New Roman" panose="02020603050405020304" pitchFamily="18" charset="0"/>
               </a:rPr>
               <a:t>cont</a:t>
             </a:r>
             <a:r>
-              <a:rPr lang="pt-BR" sz="2000" dirty="0">
+              <a:rPr lang="pt-BR" sz="1800" dirty="0">
                 <a:latin typeface="Times New Roman" panose="02020603050405020304" pitchFamily="18" charset="0"/>
                 <a:cs typeface="Times New Roman" panose="02020603050405020304" pitchFamily="18" charset="0"/>
               </a:rPr>
@@ -7220,35 +7243,35 @@
               <a:buNone/>
             </a:pPr>
             <a:r>
-              <a:rPr lang="pt-BR" sz="2000" dirty="0">
+              <a:rPr lang="pt-BR" sz="1800" dirty="0">
                 <a:latin typeface="Times New Roman" panose="02020603050405020304" pitchFamily="18" charset="0"/>
                 <a:cs typeface="Times New Roman" panose="02020603050405020304" pitchFamily="18" charset="0"/>
               </a:rPr>
               <a:t>     </a:t>
             </a:r>
             <a:r>
-              <a:rPr lang="pt-BR" sz="2000" b="1" dirty="0" err="1">
+              <a:rPr lang="pt-BR" sz="1800" b="1" dirty="0" err="1">
                 <a:latin typeface="Times New Roman" panose="02020603050405020304" pitchFamily="18" charset="0"/>
                 <a:cs typeface="Times New Roman" panose="02020603050405020304" pitchFamily="18" charset="0"/>
               </a:rPr>
               <a:t>if</a:t>
             </a:r>
             <a:r>
-              <a:rPr lang="pt-BR" sz="2000" dirty="0">
+              <a:rPr lang="pt-BR" sz="1800" dirty="0">
                 <a:latin typeface="Times New Roman" panose="02020603050405020304" pitchFamily="18" charset="0"/>
                 <a:cs typeface="Times New Roman" panose="02020603050405020304" pitchFamily="18" charset="0"/>
               </a:rPr>
               <a:t> </a:t>
             </a:r>
             <a:r>
-              <a:rPr lang="pt-BR" sz="2000" dirty="0" err="1">
+              <a:rPr lang="pt-BR" sz="1800" dirty="0" err="1">
                 <a:latin typeface="Times New Roman" panose="02020603050405020304" pitchFamily="18" charset="0"/>
                 <a:cs typeface="Times New Roman" panose="02020603050405020304" pitchFamily="18" charset="0"/>
               </a:rPr>
               <a:t>cont</a:t>
             </a:r>
             <a:r>
-              <a:rPr lang="pt-BR" sz="2000" dirty="0">
+              <a:rPr lang="pt-BR" sz="1800" dirty="0">
                 <a:latin typeface="Times New Roman" panose="02020603050405020304" pitchFamily="18" charset="0"/>
                 <a:cs typeface="Times New Roman" panose="02020603050405020304" pitchFamily="18" charset="0"/>
               </a:rPr>
@@ -7260,14 +7283,14 @@
               <a:buNone/>
             </a:pPr>
             <a:r>
-              <a:rPr lang="pt-BR" sz="2000" dirty="0">
+              <a:rPr lang="pt-BR" sz="1800" dirty="0">
                 <a:latin typeface="Times New Roman" panose="02020603050405020304" pitchFamily="18" charset="0"/>
                 <a:cs typeface="Times New Roman" panose="02020603050405020304" pitchFamily="18" charset="0"/>
               </a:rPr>
               <a:t>        </a:t>
             </a:r>
             <a:r>
-              <a:rPr lang="pt-BR" sz="2000" b="1" dirty="0">
+              <a:rPr lang="pt-BR" sz="1800" b="1" dirty="0">
                 <a:latin typeface="Times New Roman" panose="02020603050405020304" pitchFamily="18" charset="0"/>
                 <a:cs typeface="Times New Roman" panose="02020603050405020304" pitchFamily="18" charset="0"/>
               </a:rPr>
@@ -7378,7 +7401,7 @@
         </p:nvSpPr>
         <p:spPr>
           <a:xfrm>
-            <a:off x="139472" y="961630"/>
+            <a:off x="139472" y="974330"/>
             <a:ext cx="8865056" cy="4067570"/>
           </a:xfrm>
         </p:spPr>
@@ -7415,7 +7438,28 @@
                 <a:latin typeface="Times New Roman" panose="02020603050405020304" pitchFamily="18" charset="0"/>
                 <a:cs typeface="Times New Roman" panose="02020603050405020304" pitchFamily="18" charset="0"/>
               </a:rPr>
-              <a:t> = 0</a:t>
+              <a:t> = 0; entidade = </a:t>
+            </a:r>
+            <a:r>
+              <a:rPr lang="pt-BR" sz="1600" dirty="0" err="1">
+                <a:latin typeface="Times New Roman" panose="02020603050405020304" pitchFamily="18" charset="0"/>
+                <a:cs typeface="Times New Roman" panose="02020603050405020304" pitchFamily="18" charset="0"/>
+              </a:rPr>
+              <a:t>pd.</a:t>
+            </a:r>
+            <a:r>
+              <a:rPr lang="pt-BR" sz="1600" b="1" dirty="0" err="1">
+                <a:latin typeface="Times New Roman" panose="02020603050405020304" pitchFamily="18" charset="0"/>
+                <a:cs typeface="Times New Roman" panose="02020603050405020304" pitchFamily="18" charset="0"/>
+              </a:rPr>
+              <a:t>DataFrame</a:t>
+            </a:r>
+            <a:r>
+              <a:rPr lang="pt-BR" sz="1600" dirty="0">
+                <a:latin typeface="Times New Roman" panose="02020603050405020304" pitchFamily="18" charset="0"/>
+                <a:cs typeface="Times New Roman" panose="02020603050405020304" pitchFamily="18" charset="0"/>
+              </a:rPr>
+              <a:t>()</a:t>
             </a:r>
           </a:p>
           <a:p>
@@ -7423,17 +7467,38 @@
               <a:buNone/>
             </a:pPr>
             <a:r>
+              <a:rPr lang="pt-BR" sz="1600" b="1" dirty="0">
+                <a:latin typeface="Times New Roman" panose="02020603050405020304" pitchFamily="18" charset="0"/>
+                <a:cs typeface="Times New Roman" panose="02020603050405020304" pitchFamily="18" charset="0"/>
+              </a:rPr>
+              <a:t>for</a:t>
+            </a:r>
+            <a:r>
               <a:rPr lang="pt-BR" sz="1600" dirty="0">
                 <a:latin typeface="Times New Roman" panose="02020603050405020304" pitchFamily="18" charset="0"/>
                 <a:cs typeface="Times New Roman" panose="02020603050405020304" pitchFamily="18" charset="0"/>
               </a:rPr>
-              <a:t>tabela = </a:t>
+              <a:t> </a:t>
             </a:r>
             <a:r>
               <a:rPr lang="pt-BR" sz="1600" dirty="0" err="1">
                 <a:latin typeface="Times New Roman" panose="02020603050405020304" pitchFamily="18" charset="0"/>
                 <a:cs typeface="Times New Roman" panose="02020603050405020304" pitchFamily="18" charset="0"/>
               </a:rPr>
+              <a:t>chunk</a:t>
+            </a:r>
+            <a:r>
+              <a:rPr lang="pt-BR" sz="1600" dirty="0">
+                <a:latin typeface="Times New Roman" panose="02020603050405020304" pitchFamily="18" charset="0"/>
+                <a:cs typeface="Times New Roman" panose="02020603050405020304" pitchFamily="18" charset="0"/>
+              </a:rPr>
+              <a:t> in  </a:t>
+            </a:r>
+            <a:r>
+              <a:rPr lang="pt-BR" sz="1600" dirty="0" err="1">
+                <a:latin typeface="Times New Roman" panose="02020603050405020304" pitchFamily="18" charset="0"/>
+                <a:cs typeface="Times New Roman" panose="02020603050405020304" pitchFamily="18" charset="0"/>
+              </a:rPr>
               <a:t>pd.</a:t>
             </a:r>
             <a:r>
@@ -7441,13 +7506,234 @@
                 <a:latin typeface="Times New Roman" panose="02020603050405020304" pitchFamily="18" charset="0"/>
                 <a:cs typeface="Times New Roman" panose="02020603050405020304" pitchFamily="18" charset="0"/>
               </a:rPr>
-              <a:t>DataFrame</a:t>
+              <a:t>read_csv</a:t>
             </a:r>
             <a:r>
               <a:rPr lang="pt-BR" sz="1600" dirty="0">
                 <a:latin typeface="Times New Roman" panose="02020603050405020304" pitchFamily="18" charset="0"/>
                 <a:cs typeface="Times New Roman" panose="02020603050405020304" pitchFamily="18" charset="0"/>
               </a:rPr>
+              <a:t>("covidBrasil.csv", </a:t>
+            </a:r>
+            <a:r>
+              <a:rPr lang="pt-BR" sz="1600" b="1" dirty="0" err="1">
+                <a:latin typeface="Times New Roman" panose="02020603050405020304" pitchFamily="18" charset="0"/>
+                <a:cs typeface="Times New Roman" panose="02020603050405020304" pitchFamily="18" charset="0"/>
+              </a:rPr>
+              <a:t>chunksize</a:t>
+            </a:r>
+            <a:r>
+              <a:rPr lang="pt-BR" sz="1600" dirty="0">
+                <a:latin typeface="Times New Roman" panose="02020603050405020304" pitchFamily="18" charset="0"/>
+                <a:cs typeface="Times New Roman" panose="02020603050405020304" pitchFamily="18" charset="0"/>
+              </a:rPr>
+              <a:t>= 500000):</a:t>
+            </a:r>
+          </a:p>
+          <a:p>
+            <a:pPr marL="0" indent="0" algn="just">
+              <a:buNone/>
+            </a:pPr>
+            <a:r>
+              <a:rPr lang="pt-BR" sz="1600" dirty="0">
+                <a:latin typeface="Times New Roman" panose="02020603050405020304" pitchFamily="18" charset="0"/>
+                <a:cs typeface="Times New Roman" panose="02020603050405020304" pitchFamily="18" charset="0"/>
+              </a:rPr>
+              <a:t>     colunas= ["</a:t>
+            </a:r>
+            <a:r>
+              <a:rPr lang="pt-BR" sz="1600" b="1" dirty="0" err="1">
+                <a:solidFill>
+                  <a:srgbClr val="FF0000"/>
+                </a:solidFill>
+                <a:latin typeface="Times New Roman" panose="02020603050405020304" pitchFamily="18" charset="0"/>
+                <a:cs typeface="Times New Roman" panose="02020603050405020304" pitchFamily="18" charset="0"/>
+              </a:rPr>
+              <a:t>city</a:t>
+            </a:r>
+            <a:r>
+              <a:rPr lang="pt-BR" sz="1600" dirty="0">
+                <a:latin typeface="Times New Roman" panose="02020603050405020304" pitchFamily="18" charset="0"/>
+                <a:cs typeface="Times New Roman" panose="02020603050405020304" pitchFamily="18" charset="0"/>
+              </a:rPr>
+              <a:t>", "</a:t>
+            </a:r>
+            <a:r>
+              <a:rPr lang="pt-BR" sz="1600" b="1" dirty="0" err="1">
+                <a:solidFill>
+                  <a:srgbClr val="FF0000"/>
+                </a:solidFill>
+                <a:latin typeface="Times New Roman" panose="02020603050405020304" pitchFamily="18" charset="0"/>
+                <a:cs typeface="Times New Roman" panose="02020603050405020304" pitchFamily="18" charset="0"/>
+              </a:rPr>
+              <a:t>state</a:t>
+            </a:r>
+            <a:r>
+              <a:rPr lang="pt-BR" sz="1600" dirty="0">
+                <a:latin typeface="Times New Roman" panose="02020603050405020304" pitchFamily="18" charset="0"/>
+                <a:cs typeface="Times New Roman" panose="02020603050405020304" pitchFamily="18" charset="0"/>
+              </a:rPr>
+              <a:t>", "</a:t>
+            </a:r>
+            <a:r>
+              <a:rPr lang="pt-BR" sz="1600" b="1" dirty="0" err="1">
+                <a:solidFill>
+                  <a:srgbClr val="FF0000"/>
+                </a:solidFill>
+                <a:latin typeface="Times New Roman" panose="02020603050405020304" pitchFamily="18" charset="0"/>
+                <a:cs typeface="Times New Roman" panose="02020603050405020304" pitchFamily="18" charset="0"/>
+              </a:rPr>
+              <a:t>new_confirmed</a:t>
+            </a:r>
+            <a:r>
+              <a:rPr lang="pt-BR" sz="1600" dirty="0">
+                <a:latin typeface="Times New Roman" panose="02020603050405020304" pitchFamily="18" charset="0"/>
+                <a:cs typeface="Times New Roman" panose="02020603050405020304" pitchFamily="18" charset="0"/>
+              </a:rPr>
+              <a:t>"]</a:t>
+            </a:r>
+          </a:p>
+          <a:p>
+            <a:pPr marL="0" indent="0" algn="just">
+              <a:buNone/>
+            </a:pPr>
+            <a:r>
+              <a:rPr lang="pt-BR" sz="1600" dirty="0">
+                <a:latin typeface="Times New Roman" panose="02020603050405020304" pitchFamily="18" charset="0"/>
+                <a:cs typeface="Times New Roman" panose="02020603050405020304" pitchFamily="18" charset="0"/>
+              </a:rPr>
+              <a:t>     </a:t>
+            </a:r>
+            <a:r>
+              <a:rPr lang="pt-BR" sz="1600" dirty="0" err="1">
+                <a:latin typeface="Times New Roman" panose="02020603050405020304" pitchFamily="18" charset="0"/>
+                <a:cs typeface="Times New Roman" panose="02020603050405020304" pitchFamily="18" charset="0"/>
+              </a:rPr>
+              <a:t>details</a:t>
+            </a:r>
+            <a:r>
+              <a:rPr lang="pt-BR" sz="1600" dirty="0">
+                <a:latin typeface="Times New Roman" panose="02020603050405020304" pitchFamily="18" charset="0"/>
+                <a:cs typeface="Times New Roman" panose="02020603050405020304" pitchFamily="18" charset="0"/>
+              </a:rPr>
+              <a:t> = </a:t>
+            </a:r>
+            <a:r>
+              <a:rPr lang="pt-BR" sz="1600" dirty="0" err="1">
+                <a:latin typeface="Times New Roman" panose="02020603050405020304" pitchFamily="18" charset="0"/>
+                <a:cs typeface="Times New Roman" panose="02020603050405020304" pitchFamily="18" charset="0"/>
+              </a:rPr>
+              <a:t>chunk</a:t>
+            </a:r>
+            <a:r>
+              <a:rPr lang="pt-BR" sz="1600" dirty="0">
+                <a:latin typeface="Times New Roman" panose="02020603050405020304" pitchFamily="18" charset="0"/>
+                <a:cs typeface="Times New Roman" panose="02020603050405020304" pitchFamily="18" charset="0"/>
+              </a:rPr>
+              <a:t>[colunas]</a:t>
+            </a:r>
+          </a:p>
+          <a:p>
+            <a:pPr marL="0" indent="0" algn="just">
+              <a:buNone/>
+            </a:pPr>
+            <a:r>
+              <a:rPr lang="pt-BR" sz="1600" dirty="0">
+                <a:latin typeface="Times New Roman" panose="02020603050405020304" pitchFamily="18" charset="0"/>
+                <a:cs typeface="Times New Roman" panose="02020603050405020304" pitchFamily="18" charset="0"/>
+              </a:rPr>
+              <a:t>     </a:t>
+            </a:r>
+            <a:r>
+              <a:rPr lang="pt-BR" sz="1600" dirty="0" err="1">
+                <a:latin typeface="Times New Roman" panose="02020603050405020304" pitchFamily="18" charset="0"/>
+                <a:cs typeface="Times New Roman" panose="02020603050405020304" pitchFamily="18" charset="0"/>
+              </a:rPr>
+              <a:t>details</a:t>
+            </a:r>
+            <a:r>
+              <a:rPr lang="pt-BR" sz="1600" dirty="0">
+                <a:latin typeface="Times New Roman" panose="02020603050405020304" pitchFamily="18" charset="0"/>
+                <a:cs typeface="Times New Roman" panose="02020603050405020304" pitchFamily="18" charset="0"/>
+              </a:rPr>
+              <a:t>["</a:t>
+            </a:r>
+            <a:r>
+              <a:rPr lang="pt-BR" sz="1600" dirty="0" err="1">
+                <a:latin typeface="Times New Roman" panose="02020603050405020304" pitchFamily="18" charset="0"/>
+                <a:cs typeface="Times New Roman" panose="02020603050405020304" pitchFamily="18" charset="0"/>
+              </a:rPr>
+              <a:t>count</a:t>
+            </a:r>
+            <a:r>
+              <a:rPr lang="pt-BR" sz="1600" dirty="0">
+                <a:latin typeface="Times New Roman" panose="02020603050405020304" pitchFamily="18" charset="0"/>
+                <a:cs typeface="Times New Roman" panose="02020603050405020304" pitchFamily="18" charset="0"/>
+              </a:rPr>
+              <a:t>"] = 1</a:t>
+            </a:r>
+          </a:p>
+          <a:p>
+            <a:pPr marL="0" indent="0" algn="just">
+              <a:buNone/>
+            </a:pPr>
+            <a:r>
+              <a:rPr lang="pt-BR" sz="1600" dirty="0">
+                <a:latin typeface="Times New Roman" panose="02020603050405020304" pitchFamily="18" charset="0"/>
+                <a:cs typeface="Times New Roman" panose="02020603050405020304" pitchFamily="18" charset="0"/>
+              </a:rPr>
+              <a:t>     resumo = </a:t>
+            </a:r>
+            <a:r>
+              <a:rPr lang="pt-BR" sz="1600" dirty="0" err="1">
+                <a:latin typeface="Times New Roman" panose="02020603050405020304" pitchFamily="18" charset="0"/>
+                <a:cs typeface="Times New Roman" panose="02020603050405020304" pitchFamily="18" charset="0"/>
+              </a:rPr>
+              <a:t>details.</a:t>
+            </a:r>
+            <a:r>
+              <a:rPr lang="pt-BR" sz="1600" b="1" dirty="0" err="1">
+                <a:latin typeface="Times New Roman" panose="02020603050405020304" pitchFamily="18" charset="0"/>
+                <a:cs typeface="Times New Roman" panose="02020603050405020304" pitchFamily="18" charset="0"/>
+              </a:rPr>
+              <a:t>groupby</a:t>
+            </a:r>
+            <a:r>
+              <a:rPr lang="pt-BR" sz="1600" dirty="0">
+                <a:latin typeface="Times New Roman" panose="02020603050405020304" pitchFamily="18" charset="0"/>
+                <a:cs typeface="Times New Roman" panose="02020603050405020304" pitchFamily="18" charset="0"/>
+              </a:rPr>
+              <a:t>(colunas, </a:t>
+            </a:r>
+            <a:r>
+              <a:rPr lang="pt-BR" sz="1600" b="1" dirty="0" err="1">
+                <a:latin typeface="Times New Roman" panose="02020603050405020304" pitchFamily="18" charset="0"/>
+                <a:cs typeface="Times New Roman" panose="02020603050405020304" pitchFamily="18" charset="0"/>
+              </a:rPr>
+              <a:t>as_index</a:t>
+            </a:r>
+            <a:r>
+              <a:rPr lang="pt-BR" sz="1600" dirty="0">
+                <a:latin typeface="Times New Roman" panose="02020603050405020304" pitchFamily="18" charset="0"/>
+                <a:cs typeface="Times New Roman" panose="02020603050405020304" pitchFamily="18" charset="0"/>
+              </a:rPr>
+              <a:t>=False).</a:t>
+            </a:r>
+            <a:r>
+              <a:rPr lang="pt-BR" sz="1600" b="1" dirty="0" err="1">
+                <a:solidFill>
+                  <a:srgbClr val="FF0000"/>
+                </a:solidFill>
+                <a:latin typeface="Times New Roman" panose="02020603050405020304" pitchFamily="18" charset="0"/>
+                <a:cs typeface="Times New Roman" panose="02020603050405020304" pitchFamily="18" charset="0"/>
+              </a:rPr>
+              <a:t>count</a:t>
+            </a:r>
+            <a:r>
+              <a:rPr lang="pt-BR" sz="1600" dirty="0">
+                <a:latin typeface="Times New Roman" panose="02020603050405020304" pitchFamily="18" charset="0"/>
+                <a:cs typeface="Times New Roman" panose="02020603050405020304" pitchFamily="18" charset="0"/>
+              </a:rPr>
               <a:t>()</a:t>
             </a:r>
           </a:p>
@@ -7456,477 +7742,256 @@
               <a:buNone/>
             </a:pPr>
             <a:r>
+              <a:rPr lang="pt-BR" sz="1600" dirty="0">
+                <a:latin typeface="Times New Roman" panose="02020603050405020304" pitchFamily="18" charset="0"/>
+                <a:cs typeface="Times New Roman" panose="02020603050405020304" pitchFamily="18" charset="0"/>
+              </a:rPr>
+              <a:t>     entidade = </a:t>
+            </a:r>
+            <a:r>
+              <a:rPr lang="pt-BR" sz="1600" dirty="0" err="1">
+                <a:latin typeface="Times New Roman" panose="02020603050405020304" pitchFamily="18" charset="0"/>
+                <a:cs typeface="Times New Roman" panose="02020603050405020304" pitchFamily="18" charset="0"/>
+              </a:rPr>
+              <a:t>pd.</a:t>
+            </a:r>
+            <a:r>
+              <a:rPr lang="pt-BR" sz="1600" b="1" dirty="0" err="1">
+                <a:latin typeface="Times New Roman" panose="02020603050405020304" pitchFamily="18" charset="0"/>
+                <a:cs typeface="Times New Roman" panose="02020603050405020304" pitchFamily="18" charset="0"/>
+              </a:rPr>
+              <a:t>concat</a:t>
+            </a:r>
+            <a:r>
+              <a:rPr lang="pt-BR" sz="1600" dirty="0">
+                <a:latin typeface="Times New Roman" panose="02020603050405020304" pitchFamily="18" charset="0"/>
+                <a:cs typeface="Times New Roman" panose="02020603050405020304" pitchFamily="18" charset="0"/>
+              </a:rPr>
+              <a:t>([entidade, resumo])</a:t>
+            </a:r>
+          </a:p>
+          <a:p>
+            <a:pPr marL="0" indent="0" algn="just">
+              <a:buNone/>
+            </a:pPr>
+            <a:r>
+              <a:rPr lang="pt-BR" sz="1600" dirty="0">
+                <a:latin typeface="Times New Roman" panose="02020603050405020304" pitchFamily="18" charset="0"/>
+                <a:cs typeface="Times New Roman" panose="02020603050405020304" pitchFamily="18" charset="0"/>
+              </a:rPr>
+              <a:t>     </a:t>
+            </a:r>
+            <a:r>
+              <a:rPr lang="pt-BR" sz="1600" dirty="0" err="1">
+                <a:latin typeface="Times New Roman" panose="02020603050405020304" pitchFamily="18" charset="0"/>
+                <a:cs typeface="Times New Roman" panose="02020603050405020304" pitchFamily="18" charset="0"/>
+              </a:rPr>
+              <a:t>cont</a:t>
+            </a:r>
+            <a:r>
+              <a:rPr lang="pt-BR" sz="1600" dirty="0">
+                <a:latin typeface="Times New Roman" panose="02020603050405020304" pitchFamily="18" charset="0"/>
+                <a:cs typeface="Times New Roman" panose="02020603050405020304" pitchFamily="18" charset="0"/>
+              </a:rPr>
+              <a:t> = </a:t>
+            </a:r>
+            <a:r>
+              <a:rPr lang="pt-BR" sz="1600" dirty="0" err="1">
+                <a:latin typeface="Times New Roman" panose="02020603050405020304" pitchFamily="18" charset="0"/>
+                <a:cs typeface="Times New Roman" panose="02020603050405020304" pitchFamily="18" charset="0"/>
+              </a:rPr>
+              <a:t>cont</a:t>
+            </a:r>
+            <a:r>
+              <a:rPr lang="pt-BR" sz="1600" dirty="0">
+                <a:latin typeface="Times New Roman" panose="02020603050405020304" pitchFamily="18" charset="0"/>
+                <a:cs typeface="Times New Roman" panose="02020603050405020304" pitchFamily="18" charset="0"/>
+              </a:rPr>
+              <a:t> + 1</a:t>
+            </a:r>
+          </a:p>
+          <a:p>
+            <a:pPr marL="0" indent="0" algn="just">
+              <a:buNone/>
+            </a:pPr>
+            <a:r>
+              <a:rPr lang="pt-BR" sz="1600" dirty="0">
+                <a:latin typeface="Times New Roman" panose="02020603050405020304" pitchFamily="18" charset="0"/>
+                <a:cs typeface="Times New Roman" panose="02020603050405020304" pitchFamily="18" charset="0"/>
+              </a:rPr>
+              <a:t>     </a:t>
+            </a:r>
+            <a:r>
+              <a:rPr lang="pt-BR" sz="1600" b="1" dirty="0" err="1">
+                <a:latin typeface="Times New Roman" panose="02020603050405020304" pitchFamily="18" charset="0"/>
+                <a:cs typeface="Times New Roman" panose="02020603050405020304" pitchFamily="18" charset="0"/>
+              </a:rPr>
+              <a:t>if</a:t>
+            </a:r>
+            <a:r>
+              <a:rPr lang="pt-BR" sz="1600" dirty="0">
+                <a:latin typeface="Times New Roman" panose="02020603050405020304" pitchFamily="18" charset="0"/>
+                <a:cs typeface="Times New Roman" panose="02020603050405020304" pitchFamily="18" charset="0"/>
+              </a:rPr>
+              <a:t> </a:t>
+            </a:r>
+            <a:r>
+              <a:rPr lang="pt-BR" sz="1600" dirty="0" err="1">
+                <a:latin typeface="Times New Roman" panose="02020603050405020304" pitchFamily="18" charset="0"/>
+                <a:cs typeface="Times New Roman" panose="02020603050405020304" pitchFamily="18" charset="0"/>
+              </a:rPr>
+              <a:t>cont</a:t>
+            </a:r>
+            <a:r>
+              <a:rPr lang="pt-BR" sz="1600" dirty="0">
+                <a:latin typeface="Times New Roman" panose="02020603050405020304" pitchFamily="18" charset="0"/>
+                <a:cs typeface="Times New Roman" panose="02020603050405020304" pitchFamily="18" charset="0"/>
+              </a:rPr>
+              <a:t> &gt; 3:</a:t>
+            </a:r>
+          </a:p>
+          <a:p>
+            <a:pPr marL="0" indent="0" algn="just">
+              <a:buNone/>
+            </a:pPr>
+            <a:r>
+              <a:rPr lang="pt-BR" sz="1600" dirty="0">
+                <a:latin typeface="Times New Roman" panose="02020603050405020304" pitchFamily="18" charset="0"/>
+                <a:cs typeface="Times New Roman" panose="02020603050405020304" pitchFamily="18" charset="0"/>
+              </a:rPr>
+              <a:t>        </a:t>
+            </a:r>
+            <a:r>
               <a:rPr lang="pt-BR" sz="1600" b="1" dirty="0">
                 <a:latin typeface="Times New Roman" panose="02020603050405020304" pitchFamily="18" charset="0"/>
                 <a:cs typeface="Times New Roman" panose="02020603050405020304" pitchFamily="18" charset="0"/>
               </a:rPr>
-              <a:t>for</a:t>
-            </a:r>
+              <a:t>break</a:t>
+            </a:r>
+          </a:p>
+          <a:p>
+            <a:pPr marL="0" indent="0" algn="just">
+              <a:buNone/>
+            </a:pPr>
             <a:r>
               <a:rPr lang="pt-BR" sz="1600" dirty="0">
                 <a:latin typeface="Times New Roman" panose="02020603050405020304" pitchFamily="18" charset="0"/>
                 <a:cs typeface="Times New Roman" panose="02020603050405020304" pitchFamily="18" charset="0"/>
               </a:rPr>
-              <a:t> </a:t>
+              <a:t>entidade = </a:t>
             </a:r>
             <a:r>
               <a:rPr lang="pt-BR" sz="1600" dirty="0" err="1">
                 <a:latin typeface="Times New Roman" panose="02020603050405020304" pitchFamily="18" charset="0"/>
                 <a:cs typeface="Times New Roman" panose="02020603050405020304" pitchFamily="18" charset="0"/>
               </a:rPr>
-              <a:t>chunk</a:t>
+              <a:t>entidade.</a:t>
+            </a:r>
+            <a:r>
+              <a:rPr lang="pt-BR" sz="1600" b="1" dirty="0" err="1">
+                <a:latin typeface="Times New Roman" panose="02020603050405020304" pitchFamily="18" charset="0"/>
+                <a:cs typeface="Times New Roman" panose="02020603050405020304" pitchFamily="18" charset="0"/>
+              </a:rPr>
+              <a:t>groupby</a:t>
             </a:r>
             <a:r>
               <a:rPr lang="pt-BR" sz="1600" dirty="0">
                 <a:latin typeface="Times New Roman" panose="02020603050405020304" pitchFamily="18" charset="0"/>
                 <a:cs typeface="Times New Roman" panose="02020603050405020304" pitchFamily="18" charset="0"/>
               </a:rPr>
-              <a:t> in  </a:t>
+              <a:t>(colunas, </a:t>
+            </a:r>
+            <a:r>
+              <a:rPr lang="pt-BR" sz="1600" b="1" dirty="0" err="1">
+                <a:latin typeface="Times New Roman" panose="02020603050405020304" pitchFamily="18" charset="0"/>
+                <a:cs typeface="Times New Roman" panose="02020603050405020304" pitchFamily="18" charset="0"/>
+              </a:rPr>
+              <a:t>as_index</a:t>
+            </a:r>
+            <a:r>
+              <a:rPr lang="pt-BR" sz="1600" dirty="0">
+                <a:latin typeface="Times New Roman" panose="02020603050405020304" pitchFamily="18" charset="0"/>
+                <a:cs typeface="Times New Roman" panose="02020603050405020304" pitchFamily="18" charset="0"/>
+              </a:rPr>
+              <a:t>=False).</a:t>
+            </a:r>
+            <a:r>
+              <a:rPr lang="pt-BR" sz="1600" b="1" dirty="0">
+                <a:solidFill>
+                  <a:srgbClr val="FF0000"/>
+                </a:solidFill>
+                <a:latin typeface="Times New Roman" panose="02020603050405020304" pitchFamily="18" charset="0"/>
+                <a:cs typeface="Times New Roman" panose="02020603050405020304" pitchFamily="18" charset="0"/>
+              </a:rPr>
+              <a:t>sum</a:t>
+            </a:r>
+            <a:r>
+              <a:rPr lang="pt-BR" sz="1600" dirty="0">
+                <a:latin typeface="Times New Roman" panose="02020603050405020304" pitchFamily="18" charset="0"/>
+                <a:cs typeface="Times New Roman" panose="02020603050405020304" pitchFamily="18" charset="0"/>
+              </a:rPr>
+              <a:t>() </a:t>
+            </a:r>
+          </a:p>
+          <a:p>
+            <a:pPr marL="0" indent="0" algn="just">
+              <a:buNone/>
+            </a:pPr>
+            <a:r>
+              <a:rPr lang="pt-BR" sz="1600" b="1" dirty="0">
+                <a:latin typeface="Times New Roman" panose="02020603050405020304" pitchFamily="18" charset="0"/>
+                <a:cs typeface="Times New Roman" panose="02020603050405020304" pitchFamily="18" charset="0"/>
+              </a:rPr>
+              <a:t>display</a:t>
+            </a:r>
+            <a:r>
+              <a:rPr lang="pt-BR" sz="1600" dirty="0">
+                <a:latin typeface="Times New Roman" panose="02020603050405020304" pitchFamily="18" charset="0"/>
+                <a:cs typeface="Times New Roman" panose="02020603050405020304" pitchFamily="18" charset="0"/>
+              </a:rPr>
+              <a:t>(</a:t>
             </a:r>
             <a:r>
               <a:rPr lang="pt-BR" sz="1600" dirty="0" err="1">
                 <a:latin typeface="Times New Roman" panose="02020603050405020304" pitchFamily="18" charset="0"/>
                 <a:cs typeface="Times New Roman" panose="02020603050405020304" pitchFamily="18" charset="0"/>
               </a:rPr>
-              <a:t>pd.</a:t>
-            </a:r>
-            <a:r>
-              <a:rPr lang="pt-BR" sz="1600" b="1" dirty="0" err="1">
-                <a:latin typeface="Times New Roman" panose="02020603050405020304" pitchFamily="18" charset="0"/>
-                <a:cs typeface="Times New Roman" panose="02020603050405020304" pitchFamily="18" charset="0"/>
-              </a:rPr>
-              <a:t>read_csv</a:t>
+              <a:t>entidade.sort_values</a:t>
             </a:r>
             <a:r>
               <a:rPr lang="pt-BR" sz="1600" dirty="0">
                 <a:latin typeface="Times New Roman" panose="02020603050405020304" pitchFamily="18" charset="0"/>
                 <a:cs typeface="Times New Roman" panose="02020603050405020304" pitchFamily="18" charset="0"/>
               </a:rPr>
-              <a:t>("covidBrasil.csv", </a:t>
-            </a:r>
-            <a:r>
-              <a:rPr lang="pt-BR" sz="1600" b="1" dirty="0" err="1">
-                <a:latin typeface="Times New Roman" panose="02020603050405020304" pitchFamily="18" charset="0"/>
-                <a:cs typeface="Times New Roman" panose="02020603050405020304" pitchFamily="18" charset="0"/>
-              </a:rPr>
-              <a:t>chunksize</a:t>
+              <a:t>(“</a:t>
+            </a:r>
+            <a:r>
+              <a:rPr lang="pt-BR" sz="1600" b="1" dirty="0">
+                <a:latin typeface="Times New Roman" panose="02020603050405020304" pitchFamily="18" charset="0"/>
+                <a:cs typeface="Times New Roman" panose="02020603050405020304" pitchFamily="18" charset="0"/>
+              </a:rPr>
+              <a:t>uf</a:t>
             </a:r>
             <a:r>
               <a:rPr lang="pt-BR" sz="1600" dirty="0">
                 <a:latin typeface="Times New Roman" panose="02020603050405020304" pitchFamily="18" charset="0"/>
                 <a:cs typeface="Times New Roman" panose="02020603050405020304" pitchFamily="18" charset="0"/>
               </a:rPr>
-              <a:t>= 500000):</a:t>
-            </a:r>
-          </a:p>
-          <a:p>
-            <a:pPr marL="0" indent="0" algn="just">
-              <a:buNone/>
-            </a:pPr>
+              <a:t>”), </a:t>
+            </a:r>
+            <a:r>
+              <a:rPr lang="pt-BR" sz="1600" dirty="0" err="1">
+                <a:latin typeface="Times New Roman" panose="02020603050405020304" pitchFamily="18" charset="0"/>
+                <a:cs typeface="Times New Roman" panose="02020603050405020304" pitchFamily="18" charset="0"/>
+              </a:rPr>
+              <a:t>ascending</a:t>
+            </a:r>
             <a:r>
               <a:rPr lang="pt-BR" sz="1600" dirty="0">
                 <a:latin typeface="Times New Roman" panose="02020603050405020304" pitchFamily="18" charset="0"/>
                 <a:cs typeface="Times New Roman" panose="02020603050405020304" pitchFamily="18" charset="0"/>
               </a:rPr>
-              <a:t>     colunas= ["</a:t>
-            </a:r>
-            <a:r>
-              <a:rPr lang="pt-BR" sz="1600" b="1" dirty="0" err="1">
-                <a:solidFill>
-                  <a:srgbClr val="FF0000"/>
-                </a:solidFill>
-                <a:latin typeface="Times New Roman" panose="02020603050405020304" pitchFamily="18" charset="0"/>
-                <a:cs typeface="Times New Roman" panose="02020603050405020304" pitchFamily="18" charset="0"/>
-              </a:rPr>
-              <a:t>city</a:t>
-            </a:r>
-            <a:r>
-              <a:rPr lang="pt-BR" sz="1600" dirty="0">
-                <a:latin typeface="Times New Roman" panose="02020603050405020304" pitchFamily="18" charset="0"/>
-                <a:cs typeface="Times New Roman" panose="02020603050405020304" pitchFamily="18" charset="0"/>
-              </a:rPr>
-              <a:t>", "</a:t>
-            </a:r>
-            <a:r>
-              <a:rPr lang="pt-BR" sz="1600" b="1" dirty="0" err="1">
-                <a:solidFill>
-                  <a:srgbClr val="FF0000"/>
-                </a:solidFill>
-                <a:latin typeface="Times New Roman" panose="02020603050405020304" pitchFamily="18" charset="0"/>
-                <a:cs typeface="Times New Roman" panose="02020603050405020304" pitchFamily="18" charset="0"/>
-              </a:rPr>
-              <a:t>state</a:t>
-            </a:r>
-            <a:r>
-              <a:rPr lang="pt-BR" sz="1600" dirty="0">
-                <a:latin typeface="Times New Roman" panose="02020603050405020304" pitchFamily="18" charset="0"/>
-                <a:cs typeface="Times New Roman" panose="02020603050405020304" pitchFamily="18" charset="0"/>
-              </a:rPr>
-              <a:t>", ... "</a:t>
-            </a:r>
-            <a:r>
-              <a:rPr lang="pt-BR" sz="1600" b="1" dirty="0" err="1">
-                <a:solidFill>
-                  <a:srgbClr val="FF0000"/>
-                </a:solidFill>
-                <a:latin typeface="Times New Roman" panose="02020603050405020304" pitchFamily="18" charset="0"/>
-                <a:cs typeface="Times New Roman" panose="02020603050405020304" pitchFamily="18" charset="0"/>
-              </a:rPr>
-              <a:t>new_confirmed</a:t>
-            </a:r>
-            <a:r>
-              <a:rPr lang="pt-BR" sz="1600" dirty="0">
-                <a:latin typeface="Times New Roman" panose="02020603050405020304" pitchFamily="18" charset="0"/>
-                <a:cs typeface="Times New Roman" panose="02020603050405020304" pitchFamily="18" charset="0"/>
-              </a:rPr>
-              <a:t>"]</a:t>
-            </a:r>
-          </a:p>
-          <a:p>
-            <a:pPr marL="0" indent="0" algn="just">
-              <a:buNone/>
-            </a:pPr>
-            <a:r>
-              <a:rPr lang="pt-BR" sz="1600" dirty="0">
-                <a:latin typeface="Times New Roman" panose="02020603050405020304" pitchFamily="18" charset="0"/>
-                <a:cs typeface="Times New Roman" panose="02020603050405020304" pitchFamily="18" charset="0"/>
-              </a:rPr>
-              <a:t>     </a:t>
-            </a:r>
-            <a:r>
-              <a:rPr lang="pt-BR" sz="1600" dirty="0" err="1">
-                <a:latin typeface="Times New Roman" panose="02020603050405020304" pitchFamily="18" charset="0"/>
-                <a:cs typeface="Times New Roman" panose="02020603050405020304" pitchFamily="18" charset="0"/>
-              </a:rPr>
-              <a:t>filtro_chunk</a:t>
-            </a:r>
-            <a:r>
-              <a:rPr lang="pt-BR" sz="1600" dirty="0">
-                <a:latin typeface="Times New Roman" panose="02020603050405020304" pitchFamily="18" charset="0"/>
-                <a:cs typeface="Times New Roman" panose="02020603050405020304" pitchFamily="18" charset="0"/>
-              </a:rPr>
-              <a:t> = </a:t>
-            </a:r>
-            <a:r>
-              <a:rPr lang="pt-BR" sz="1600" dirty="0" err="1">
-                <a:latin typeface="Times New Roman" panose="02020603050405020304" pitchFamily="18" charset="0"/>
-                <a:cs typeface="Times New Roman" panose="02020603050405020304" pitchFamily="18" charset="0"/>
-              </a:rPr>
-              <a:t>chunk</a:t>
-            </a:r>
-            <a:r>
-              <a:rPr lang="pt-BR" sz="1600" dirty="0">
-                <a:latin typeface="Times New Roman" panose="02020603050405020304" pitchFamily="18" charset="0"/>
-                <a:cs typeface="Times New Roman" panose="02020603050405020304" pitchFamily="18" charset="0"/>
-              </a:rPr>
-              <a:t>[colunas]</a:t>
-            </a:r>
-          </a:p>
-          <a:p>
-            <a:pPr marL="0" indent="0" algn="just">
-              <a:buNone/>
-            </a:pPr>
-            <a:r>
-              <a:rPr lang="pt-BR" sz="1600" dirty="0">
-                <a:latin typeface="Times New Roman" panose="02020603050405020304" pitchFamily="18" charset="0"/>
-                <a:cs typeface="Times New Roman" panose="02020603050405020304" pitchFamily="18" charset="0"/>
-              </a:rPr>
-              <a:t>     resumo = </a:t>
-            </a:r>
-            <a:r>
-              <a:rPr lang="pt-BR" sz="1600" dirty="0" err="1">
-                <a:latin typeface="Times New Roman" panose="02020603050405020304" pitchFamily="18" charset="0"/>
-                <a:cs typeface="Times New Roman" panose="02020603050405020304" pitchFamily="18" charset="0"/>
-              </a:rPr>
-              <a:t>filtro_chunk.</a:t>
-            </a:r>
-            <a:r>
-              <a:rPr lang="pt-BR" sz="1600" b="1" dirty="0" err="1">
-                <a:latin typeface="Times New Roman" panose="02020603050405020304" pitchFamily="18" charset="0"/>
-                <a:cs typeface="Times New Roman" panose="02020603050405020304" pitchFamily="18" charset="0"/>
-              </a:rPr>
-              <a:t>groupby</a:t>
-            </a:r>
-            <a:r>
-              <a:rPr lang="pt-BR" sz="1600" dirty="0">
-                <a:latin typeface="Times New Roman" panose="02020603050405020304" pitchFamily="18" charset="0"/>
-                <a:cs typeface="Times New Roman" panose="02020603050405020304" pitchFamily="18" charset="0"/>
-              </a:rPr>
-              <a:t>("</a:t>
-            </a:r>
-            <a:r>
-              <a:rPr lang="pt-BR" sz="1600" b="1" dirty="0" err="1">
-                <a:solidFill>
-                  <a:srgbClr val="FF0000"/>
-                </a:solidFill>
-                <a:latin typeface="Times New Roman" panose="02020603050405020304" pitchFamily="18" charset="0"/>
-                <a:cs typeface="Times New Roman" panose="02020603050405020304" pitchFamily="18" charset="0"/>
-              </a:rPr>
-              <a:t>city</a:t>
-            </a:r>
-            <a:r>
-              <a:rPr lang="pt-BR" sz="1600" dirty="0">
-                <a:latin typeface="Times New Roman" panose="02020603050405020304" pitchFamily="18" charset="0"/>
-                <a:cs typeface="Times New Roman" panose="02020603050405020304" pitchFamily="18" charset="0"/>
-              </a:rPr>
-              <a:t>", </a:t>
-            </a:r>
-            <a:r>
-              <a:rPr lang="pt-BR" sz="1600" b="1" dirty="0" err="1">
-                <a:latin typeface="Times New Roman" panose="02020603050405020304" pitchFamily="18" charset="0"/>
-                <a:cs typeface="Times New Roman" panose="02020603050405020304" pitchFamily="18" charset="0"/>
-              </a:rPr>
-              <a:t>as_index</a:t>
-            </a:r>
-            <a:r>
-              <a:rPr lang="pt-BR" sz="1600" dirty="0">
-                <a:latin typeface="Times New Roman" panose="02020603050405020304" pitchFamily="18" charset="0"/>
-                <a:cs typeface="Times New Roman" panose="02020603050405020304" pitchFamily="18" charset="0"/>
-              </a:rPr>
-              <a:t>=False).</a:t>
-            </a:r>
-            <a:r>
-              <a:rPr lang="pt-BR" sz="1600" b="1" dirty="0" err="1">
-                <a:latin typeface="Times New Roman" panose="02020603050405020304" pitchFamily="18" charset="0"/>
-                <a:cs typeface="Times New Roman" panose="02020603050405020304" pitchFamily="18" charset="0"/>
-              </a:rPr>
-              <a:t>count</a:t>
-            </a:r>
-            <a:r>
-              <a:rPr lang="pt-BR" sz="1600" dirty="0">
-                <a:latin typeface="Times New Roman" panose="02020603050405020304" pitchFamily="18" charset="0"/>
-                <a:cs typeface="Times New Roman" panose="02020603050405020304" pitchFamily="18" charset="0"/>
-              </a:rPr>
-              <a:t>()</a:t>
-            </a:r>
-          </a:p>
-          <a:p>
-            <a:pPr marL="0" indent="0" algn="just">
-              <a:buNone/>
-            </a:pPr>
-            <a:r>
-              <a:rPr lang="pt-BR" sz="1600" dirty="0">
-                <a:latin typeface="Times New Roman" panose="02020603050405020304" pitchFamily="18" charset="0"/>
-                <a:cs typeface="Times New Roman" panose="02020603050405020304" pitchFamily="18" charset="0"/>
-              </a:rPr>
-              <a:t>     tabela = </a:t>
-            </a:r>
-            <a:r>
-              <a:rPr lang="pt-BR" sz="1600" dirty="0" err="1">
-                <a:latin typeface="Times New Roman" panose="02020603050405020304" pitchFamily="18" charset="0"/>
-                <a:cs typeface="Times New Roman" panose="02020603050405020304" pitchFamily="18" charset="0"/>
-              </a:rPr>
-              <a:t>pd.</a:t>
-            </a:r>
-            <a:r>
-              <a:rPr lang="pt-BR" sz="1600" b="1" dirty="0" err="1">
-                <a:latin typeface="Times New Roman" panose="02020603050405020304" pitchFamily="18" charset="0"/>
-                <a:cs typeface="Times New Roman" panose="02020603050405020304" pitchFamily="18" charset="0"/>
-              </a:rPr>
-              <a:t>concat</a:t>
-            </a:r>
-            <a:r>
-              <a:rPr lang="pt-BR" sz="1600" dirty="0">
-                <a:latin typeface="Times New Roman" panose="02020603050405020304" pitchFamily="18" charset="0"/>
-                <a:cs typeface="Times New Roman" panose="02020603050405020304" pitchFamily="18" charset="0"/>
-              </a:rPr>
-              <a:t>([tabela, resumo])</a:t>
-            </a:r>
-          </a:p>
-          <a:p>
-            <a:pPr marL="0" indent="0" algn="just">
-              <a:buNone/>
-            </a:pPr>
-            <a:r>
-              <a:rPr lang="pt-BR" sz="1600" dirty="0">
-                <a:latin typeface="Times New Roman" panose="02020603050405020304" pitchFamily="18" charset="0"/>
-                <a:cs typeface="Times New Roman" panose="02020603050405020304" pitchFamily="18" charset="0"/>
-              </a:rPr>
-              <a:t>     </a:t>
-            </a:r>
-            <a:r>
-              <a:rPr lang="pt-BR" sz="1600" dirty="0" err="1">
-                <a:latin typeface="Times New Roman" panose="02020603050405020304" pitchFamily="18" charset="0"/>
-                <a:cs typeface="Times New Roman" panose="02020603050405020304" pitchFamily="18" charset="0"/>
-              </a:rPr>
-              <a:t>cont</a:t>
-            </a:r>
-            <a:r>
-              <a:rPr lang="pt-BR" sz="1600" dirty="0">
-                <a:latin typeface="Times New Roman" panose="02020603050405020304" pitchFamily="18" charset="0"/>
-                <a:cs typeface="Times New Roman" panose="02020603050405020304" pitchFamily="18" charset="0"/>
-              </a:rPr>
-              <a:t> = </a:t>
-            </a:r>
-            <a:r>
-              <a:rPr lang="pt-BR" sz="1600" dirty="0" err="1">
-                <a:latin typeface="Times New Roman" panose="02020603050405020304" pitchFamily="18" charset="0"/>
-                <a:cs typeface="Times New Roman" panose="02020603050405020304" pitchFamily="18" charset="0"/>
-              </a:rPr>
-              <a:t>cont</a:t>
-            </a:r>
-            <a:r>
-              <a:rPr lang="pt-BR" sz="1600" dirty="0">
-                <a:latin typeface="Times New Roman" panose="02020603050405020304" pitchFamily="18" charset="0"/>
-                <a:cs typeface="Times New Roman" panose="02020603050405020304" pitchFamily="18" charset="0"/>
-              </a:rPr>
-              <a:t> + 1</a:t>
-            </a:r>
-          </a:p>
-          <a:p>
-            <a:pPr marL="0" indent="0" algn="just">
-              <a:buNone/>
-            </a:pPr>
-            <a:r>
-              <a:rPr lang="pt-BR" sz="1600" dirty="0">
-                <a:latin typeface="Times New Roman" panose="02020603050405020304" pitchFamily="18" charset="0"/>
-                <a:cs typeface="Times New Roman" panose="02020603050405020304" pitchFamily="18" charset="0"/>
-              </a:rPr>
-              <a:t>     </a:t>
-            </a:r>
-            <a:r>
-              <a:rPr lang="pt-BR" sz="1600" b="1" dirty="0" err="1">
-                <a:latin typeface="Times New Roman" panose="02020603050405020304" pitchFamily="18" charset="0"/>
-                <a:cs typeface="Times New Roman" panose="02020603050405020304" pitchFamily="18" charset="0"/>
-              </a:rPr>
-              <a:t>if</a:t>
-            </a:r>
-            <a:r>
-              <a:rPr lang="pt-BR" sz="1600" dirty="0">
-                <a:latin typeface="Times New Roman" panose="02020603050405020304" pitchFamily="18" charset="0"/>
-                <a:cs typeface="Times New Roman" panose="02020603050405020304" pitchFamily="18" charset="0"/>
-              </a:rPr>
-              <a:t> </a:t>
-            </a:r>
-            <a:r>
-              <a:rPr lang="pt-BR" sz="1600" dirty="0" err="1">
-                <a:latin typeface="Times New Roman" panose="02020603050405020304" pitchFamily="18" charset="0"/>
-                <a:cs typeface="Times New Roman" panose="02020603050405020304" pitchFamily="18" charset="0"/>
-              </a:rPr>
-              <a:t>cont</a:t>
-            </a:r>
-            <a:r>
-              <a:rPr lang="pt-BR" sz="1600" dirty="0">
-                <a:latin typeface="Times New Roman" panose="02020603050405020304" pitchFamily="18" charset="0"/>
-                <a:cs typeface="Times New Roman" panose="02020603050405020304" pitchFamily="18" charset="0"/>
-              </a:rPr>
-              <a:t> &gt; 3:</a:t>
-            </a:r>
-          </a:p>
-          <a:p>
-            <a:pPr marL="0" indent="0" algn="just">
-              <a:buNone/>
-            </a:pPr>
-            <a:r>
-              <a:rPr lang="pt-BR" sz="1600" dirty="0">
-                <a:latin typeface="Times New Roman" panose="02020603050405020304" pitchFamily="18" charset="0"/>
-                <a:cs typeface="Times New Roman" panose="02020603050405020304" pitchFamily="18" charset="0"/>
-              </a:rPr>
-              <a:t>        </a:t>
-            </a:r>
-            <a:r>
-              <a:rPr lang="pt-BR" sz="1600" b="1" dirty="0">
-                <a:latin typeface="Times New Roman" panose="02020603050405020304" pitchFamily="18" charset="0"/>
-                <a:cs typeface="Times New Roman" panose="02020603050405020304" pitchFamily="18" charset="0"/>
-              </a:rPr>
-              <a:t>break</a:t>
-            </a:r>
-          </a:p>
-          <a:p>
-            <a:pPr marL="0" indent="0" algn="just">
-              <a:buNone/>
-            </a:pPr>
-            <a:r>
-              <a:rPr lang="pt-BR" sz="1600" dirty="0">
-                <a:latin typeface="Times New Roman" panose="02020603050405020304" pitchFamily="18" charset="0"/>
-                <a:cs typeface="Times New Roman" panose="02020603050405020304" pitchFamily="18" charset="0"/>
-              </a:rPr>
-              <a:t>tabela = </a:t>
-            </a:r>
-            <a:r>
-              <a:rPr lang="pt-BR" sz="1600" dirty="0" err="1">
-                <a:latin typeface="Times New Roman" panose="02020603050405020304" pitchFamily="18" charset="0"/>
-                <a:cs typeface="Times New Roman" panose="02020603050405020304" pitchFamily="18" charset="0"/>
-              </a:rPr>
-              <a:t>tabela.</a:t>
-            </a:r>
-            <a:r>
-              <a:rPr lang="pt-BR" sz="1600" b="1" dirty="0" err="1">
-                <a:latin typeface="Times New Roman" panose="02020603050405020304" pitchFamily="18" charset="0"/>
-                <a:cs typeface="Times New Roman" panose="02020603050405020304" pitchFamily="18" charset="0"/>
-              </a:rPr>
-              <a:t>groupby</a:t>
-            </a:r>
-            <a:r>
-              <a:rPr lang="pt-BR" sz="1600" dirty="0">
-                <a:latin typeface="Times New Roman" panose="02020603050405020304" pitchFamily="18" charset="0"/>
-                <a:cs typeface="Times New Roman" panose="02020603050405020304" pitchFamily="18" charset="0"/>
-              </a:rPr>
-              <a:t>("</a:t>
-            </a:r>
-            <a:r>
-              <a:rPr lang="pt-BR" sz="1600" b="1" dirty="0" err="1">
-                <a:solidFill>
-                  <a:srgbClr val="FF0000"/>
-                </a:solidFill>
-                <a:latin typeface="Times New Roman" panose="02020603050405020304" pitchFamily="18" charset="0"/>
-                <a:cs typeface="Times New Roman" panose="02020603050405020304" pitchFamily="18" charset="0"/>
-              </a:rPr>
-              <a:t>city</a:t>
-            </a:r>
-            <a:r>
-              <a:rPr lang="pt-BR" sz="1600" dirty="0">
-                <a:latin typeface="Times New Roman" panose="02020603050405020304" pitchFamily="18" charset="0"/>
-                <a:cs typeface="Times New Roman" panose="02020603050405020304" pitchFamily="18" charset="0"/>
-              </a:rPr>
-              <a:t>", </a:t>
-            </a:r>
-            <a:r>
-              <a:rPr lang="pt-BR" sz="1600" b="1" dirty="0" err="1">
-                <a:latin typeface="Times New Roman" panose="02020603050405020304" pitchFamily="18" charset="0"/>
-                <a:cs typeface="Times New Roman" panose="02020603050405020304" pitchFamily="18" charset="0"/>
-              </a:rPr>
-              <a:t>as_index</a:t>
-            </a:r>
-            <a:r>
-              <a:rPr lang="pt-BR" sz="1600" dirty="0">
-                <a:latin typeface="Times New Roman" panose="02020603050405020304" pitchFamily="18" charset="0"/>
-                <a:cs typeface="Times New Roman" panose="02020603050405020304" pitchFamily="18" charset="0"/>
-              </a:rPr>
-              <a:t>=False).</a:t>
-            </a:r>
-            <a:r>
-              <a:rPr lang="pt-BR" sz="1600" b="1" dirty="0" err="1">
-                <a:latin typeface="Times New Roman" panose="02020603050405020304" pitchFamily="18" charset="0"/>
-                <a:cs typeface="Times New Roman" panose="02020603050405020304" pitchFamily="18" charset="0"/>
-              </a:rPr>
-              <a:t>count</a:t>
-            </a:r>
-            <a:r>
-              <a:rPr lang="pt-BR" sz="1600" dirty="0">
-                <a:latin typeface="Times New Roman" panose="02020603050405020304" pitchFamily="18" charset="0"/>
-                <a:cs typeface="Times New Roman" panose="02020603050405020304" pitchFamily="18" charset="0"/>
-              </a:rPr>
-              <a:t>() </a:t>
-            </a:r>
-          </a:p>
-          <a:p>
-            <a:pPr marL="0" indent="0" algn="just">
-              <a:buNone/>
-            </a:pPr>
-            <a:r>
-              <a:rPr lang="pt-BR" sz="1600" b="1" dirty="0">
-                <a:latin typeface="Times New Roman" panose="02020603050405020304" pitchFamily="18" charset="0"/>
-                <a:cs typeface="Times New Roman" panose="02020603050405020304" pitchFamily="18" charset="0"/>
-              </a:rPr>
-              <a:t>display</a:t>
-            </a:r>
-            <a:r>
-              <a:rPr lang="pt-BR" sz="1600" dirty="0">
-                <a:latin typeface="Times New Roman" panose="02020603050405020304" pitchFamily="18" charset="0"/>
-                <a:cs typeface="Times New Roman" panose="02020603050405020304" pitchFamily="18" charset="0"/>
-              </a:rPr>
-              <a:t>(tabela)</a:t>
+              <a:t>=False)</a:t>
             </a:r>
             <a:endParaRPr lang="pt-BR" sz="1600" b="1" dirty="0">
               <a:latin typeface="Times New Roman" panose="02020603050405020304" pitchFamily="18" charset="0"/>

</xml_diff>